<commit_message>
Added MSA Assessment Deck.
</commit_message>
<xml_diff>
--- a/MSA Assessment Deck.pptx
+++ b/MSA Assessment Deck.pptx
@@ -5,19 +5,17 @@
     <p:sldMasterId id="2147483648" r:id="rId1"/>
   </p:sldMasterIdLst>
   <p:notesMasterIdLst>
-    <p:notesMasterId r:id="rId12"/>
+    <p:notesMasterId r:id="rId10"/>
   </p:notesMasterIdLst>
   <p:sldIdLst>
-    <p:sldId id="266" r:id="rId2"/>
-    <p:sldId id="256" r:id="rId3"/>
-    <p:sldId id="257" r:id="rId4"/>
+    <p:sldId id="256" r:id="rId2"/>
+    <p:sldId id="257" r:id="rId3"/>
+    <p:sldId id="265" r:id="rId4"/>
     <p:sldId id="263" r:id="rId5"/>
-    <p:sldId id="258" r:id="rId6"/>
-    <p:sldId id="265" r:id="rId7"/>
-    <p:sldId id="260" r:id="rId8"/>
-    <p:sldId id="261" r:id="rId9"/>
-    <p:sldId id="264" r:id="rId10"/>
-    <p:sldId id="262" r:id="rId11"/>
+    <p:sldId id="266" r:id="rId6"/>
+    <p:sldId id="258" r:id="rId7"/>
+    <p:sldId id="267" r:id="rId8"/>
+    <p:sldId id="268" r:id="rId9"/>
   </p:sldIdLst>
   <p:sldSz cx="12192000" cy="6858000"/>
   <p:notesSz cx="6858000" cy="9144000"/>
@@ -206,7 +204,7 @@
           <a:p>
             <a:fld id="{9FB5EA18-F66C-4D75-8C80-0C1A1E868DE6}" type="datetimeFigureOut">
               <a:rPr lang="en-US" smtClean="0"/>
-              <a:t>11/19/2016</a:t>
+              <a:t>11/25/2016</a:t>
             </a:fld>
             <a:endParaRPr lang="en-US"/>
           </a:p>
@@ -546,7 +544,7 @@
           <a:p>
             <a:fld id="{A008DDF4-253B-4E36-BE28-46B8E6426B7B}" type="slidenum">
               <a:rPr lang="en-US" smtClean="0"/>
-              <a:t>2</a:t>
+              <a:t>1</a:t>
             </a:fld>
             <a:endParaRPr lang="en-US"/>
           </a:p>
@@ -644,7 +642,7 @@
           <a:p>
             <a:fld id="{A008DDF4-253B-4E36-BE28-46B8E6426B7B}" type="slidenum">
               <a:rPr lang="en-US" smtClean="0"/>
-              <a:t>3</a:t>
+              <a:t>2</a:t>
             </a:fld>
             <a:endParaRPr lang="en-US"/>
           </a:p>
@@ -709,8 +707,13 @@
           <a:p>
             <a:r>
               <a:rPr lang="en-US" dirty="0"/>
-              <a:t>User Experience</a:t>
-            </a:r>
+              <a:t>Advanced</a:t>
+            </a:r>
+            <a:r>
+              <a:rPr lang="en-US" baseline="0" dirty="0"/>
+              <a:t> features…</a:t>
+            </a:r>
+            <a:endParaRPr lang="en-US" dirty="0"/>
           </a:p>
         </p:txBody>
       </p:sp>
@@ -731,7 +734,7 @@
           <a:p>
             <a:fld id="{A008DDF4-253B-4E36-BE28-46B8E6426B7B}" type="slidenum">
               <a:rPr lang="en-US" smtClean="0"/>
-              <a:t>4</a:t>
+              <a:t>3</a:t>
             </a:fld>
             <a:endParaRPr lang="en-US"/>
           </a:p>
@@ -740,7 +743,7 @@
     </p:spTree>
     <p:extLst>
       <p:ext uri="{BB962C8B-B14F-4D97-AF65-F5344CB8AC3E}">
-        <p14:creationId xmlns:p14="http://schemas.microsoft.com/office/powerpoint/2010/main" val="3826695956"/>
+        <p14:creationId xmlns:p14="http://schemas.microsoft.com/office/powerpoint/2010/main" val="587569099"/>
       </p:ext>
     </p:extLst>
   </p:cSld>
@@ -796,7 +799,7 @@
           <a:p>
             <a:r>
               <a:rPr lang="en-US" dirty="0"/>
-              <a:t>Talk about your database, what schema you used and what data you used</a:t>
+              <a:t>User Experience</a:t>
             </a:r>
           </a:p>
         </p:txBody>
@@ -818,7 +821,7 @@
           <a:p>
             <a:fld id="{A008DDF4-253B-4E36-BE28-46B8E6426B7B}" type="slidenum">
               <a:rPr lang="en-US" smtClean="0"/>
-              <a:t>5</a:t>
+              <a:t>4</a:t>
             </a:fld>
             <a:endParaRPr lang="en-US"/>
           </a:p>
@@ -827,7 +830,7 @@
     </p:spTree>
     <p:extLst>
       <p:ext uri="{BB962C8B-B14F-4D97-AF65-F5344CB8AC3E}">
-        <p14:creationId xmlns:p14="http://schemas.microsoft.com/office/powerpoint/2010/main" val="2860620212"/>
+        <p14:creationId xmlns:p14="http://schemas.microsoft.com/office/powerpoint/2010/main" val="3826695956"/>
       </p:ext>
     </p:extLst>
   </p:cSld>
@@ -883,13 +886,8 @@
           <a:p>
             <a:r>
               <a:rPr lang="en-US" dirty="0"/>
-              <a:t>Advanced</a:t>
-            </a:r>
-            <a:r>
-              <a:rPr lang="en-US" baseline="0" dirty="0"/>
-              <a:t> features…</a:t>
-            </a:r>
-            <a:endParaRPr lang="en-US" dirty="0"/>
+              <a:t>User Experience</a:t>
+            </a:r>
           </a:p>
         </p:txBody>
       </p:sp>
@@ -910,7 +908,7 @@
           <a:p>
             <a:fld id="{A008DDF4-253B-4E36-BE28-46B8E6426B7B}" type="slidenum">
               <a:rPr lang="en-US" smtClean="0"/>
-              <a:t>6</a:t>
+              <a:t>5</a:t>
             </a:fld>
             <a:endParaRPr lang="en-US"/>
           </a:p>
@@ -919,7 +917,7 @@
     </p:spTree>
     <p:extLst>
       <p:ext uri="{BB962C8B-B14F-4D97-AF65-F5344CB8AC3E}">
-        <p14:creationId xmlns:p14="http://schemas.microsoft.com/office/powerpoint/2010/main" val="587569099"/>
+        <p14:creationId xmlns:p14="http://schemas.microsoft.com/office/powerpoint/2010/main" val="305112165"/>
       </p:ext>
     </p:extLst>
   </p:cSld>
@@ -975,7 +973,7 @@
           <a:p>
             <a:r>
               <a:rPr lang="en-US" dirty="0"/>
-              <a:t>Explain your Azure features here</a:t>
+              <a:t>Talk about your database, what schema you used and what data you used</a:t>
             </a:r>
           </a:p>
         </p:txBody>
@@ -997,7 +995,7 @@
           <a:p>
             <a:fld id="{A008DDF4-253B-4E36-BE28-46B8E6426B7B}" type="slidenum">
               <a:rPr lang="en-US" smtClean="0"/>
-              <a:t>7</a:t>
+              <a:t>6</a:t>
             </a:fld>
             <a:endParaRPr lang="en-US"/>
           </a:p>
@@ -1006,7 +1004,7 @@
     </p:spTree>
     <p:extLst>
       <p:ext uri="{BB962C8B-B14F-4D97-AF65-F5344CB8AC3E}">
-        <p14:creationId xmlns:p14="http://schemas.microsoft.com/office/powerpoint/2010/main" val="3424210924"/>
+        <p14:creationId xmlns:p14="http://schemas.microsoft.com/office/powerpoint/2010/main" val="2860620212"/>
       </p:ext>
     </p:extLst>
   </p:cSld>
@@ -1062,13 +1060,8 @@
           <a:p>
             <a:r>
               <a:rPr lang="en-US" dirty="0"/>
-              <a:t>Advanced</a:t>
-            </a:r>
-            <a:r>
-              <a:rPr lang="en-US" baseline="0" dirty="0"/>
-              <a:t> features…</a:t>
-            </a:r>
-            <a:endParaRPr lang="en-US" dirty="0"/>
+              <a:t>Talk about your database, what schema you used and what data you used</a:t>
+            </a:r>
           </a:p>
         </p:txBody>
       </p:sp>
@@ -1089,7 +1082,7 @@
           <a:p>
             <a:fld id="{A008DDF4-253B-4E36-BE28-46B8E6426B7B}" type="slidenum">
               <a:rPr lang="en-US" smtClean="0"/>
-              <a:t>8</a:t>
+              <a:t>7</a:t>
             </a:fld>
             <a:endParaRPr lang="en-US"/>
           </a:p>
@@ -1098,191 +1091,7 @@
     </p:spTree>
     <p:extLst>
       <p:ext uri="{BB962C8B-B14F-4D97-AF65-F5344CB8AC3E}">
-        <p14:creationId xmlns:p14="http://schemas.microsoft.com/office/powerpoint/2010/main" val="2146667125"/>
-      </p:ext>
-    </p:extLst>
-  </p:cSld>
-  <p:clrMapOvr>
-    <a:masterClrMapping/>
-  </p:clrMapOvr>
-</p:notes>
-</file>
-
-<file path=ppt/notesSlides/notesSlide8.xml><?xml version="1.0" encoding="utf-8"?>
-<p:notes xmlns:a="http://schemas.openxmlformats.org/drawingml/2006/main" xmlns:r="http://schemas.openxmlformats.org/officeDocument/2006/relationships" xmlns:p="http://schemas.openxmlformats.org/presentationml/2006/main">
-  <p:cSld>
-    <p:spTree>
-      <p:nvGrpSpPr>
-        <p:cNvPr id="1" name=""/>
-        <p:cNvGrpSpPr/>
-        <p:nvPr/>
-      </p:nvGrpSpPr>
-      <p:grpSpPr>
-        <a:xfrm>
-          <a:off x="0" y="0"/>
-          <a:ext cx="0" cy="0"/>
-          <a:chOff x="0" y="0"/>
-          <a:chExt cx="0" cy="0"/>
-        </a:xfrm>
-      </p:grpSpPr>
-      <p:sp>
-        <p:nvSpPr>
-          <p:cNvPr id="2" name="Slide Image Placeholder 1"/>
-          <p:cNvSpPr>
-            <a:spLocks noGrp="1" noRot="1" noChangeAspect="1"/>
-          </p:cNvSpPr>
-          <p:nvPr>
-            <p:ph type="sldImg"/>
-          </p:nvPr>
-        </p:nvSpPr>
-        <p:spPr/>
-      </p:sp>
-      <p:sp>
-        <p:nvSpPr>
-          <p:cNvPr id="3" name="Notes Placeholder 2"/>
-          <p:cNvSpPr>
-            <a:spLocks noGrp="1"/>
-          </p:cNvSpPr>
-          <p:nvPr>
-            <p:ph type="body" idx="1"/>
-          </p:nvPr>
-        </p:nvSpPr>
-        <p:spPr/>
-        <p:txBody>
-          <a:bodyPr/>
-          <a:lstStyle/>
-          <a:p>
-            <a:r>
-              <a:rPr lang="en-US" dirty="0"/>
-              <a:t>Advanced</a:t>
-            </a:r>
-            <a:r>
-              <a:rPr lang="en-US" baseline="0" dirty="0"/>
-              <a:t> considerations…</a:t>
-            </a:r>
-            <a:endParaRPr lang="en-US" dirty="0"/>
-          </a:p>
-        </p:txBody>
-      </p:sp>
-      <p:sp>
-        <p:nvSpPr>
-          <p:cNvPr id="4" name="Slide Number Placeholder 3"/>
-          <p:cNvSpPr>
-            <a:spLocks noGrp="1"/>
-          </p:cNvSpPr>
-          <p:nvPr>
-            <p:ph type="sldNum" sz="quarter" idx="10"/>
-          </p:nvPr>
-        </p:nvSpPr>
-        <p:spPr/>
-        <p:txBody>
-          <a:bodyPr/>
-          <a:lstStyle/>
-          <a:p>
-            <a:fld id="{A008DDF4-253B-4E36-BE28-46B8E6426B7B}" type="slidenum">
-              <a:rPr lang="en-US" smtClean="0"/>
-              <a:t>9</a:t>
-            </a:fld>
-            <a:endParaRPr lang="en-US"/>
-          </a:p>
-        </p:txBody>
-      </p:sp>
-    </p:spTree>
-    <p:extLst>
-      <p:ext uri="{BB962C8B-B14F-4D97-AF65-F5344CB8AC3E}">
-        <p14:creationId xmlns:p14="http://schemas.microsoft.com/office/powerpoint/2010/main" val="65477906"/>
-      </p:ext>
-    </p:extLst>
-  </p:cSld>
-  <p:clrMapOvr>
-    <a:masterClrMapping/>
-  </p:clrMapOvr>
-</p:notes>
-</file>
-
-<file path=ppt/notesSlides/notesSlide9.xml><?xml version="1.0" encoding="utf-8"?>
-<p:notes xmlns:a="http://schemas.openxmlformats.org/drawingml/2006/main" xmlns:r="http://schemas.openxmlformats.org/officeDocument/2006/relationships" xmlns:p="http://schemas.openxmlformats.org/presentationml/2006/main">
-  <p:cSld>
-    <p:spTree>
-      <p:nvGrpSpPr>
-        <p:cNvPr id="1" name=""/>
-        <p:cNvGrpSpPr/>
-        <p:nvPr/>
-      </p:nvGrpSpPr>
-      <p:grpSpPr>
-        <a:xfrm>
-          <a:off x="0" y="0"/>
-          <a:ext cx="0" cy="0"/>
-          <a:chOff x="0" y="0"/>
-          <a:chExt cx="0" cy="0"/>
-        </a:xfrm>
-      </p:grpSpPr>
-      <p:sp>
-        <p:nvSpPr>
-          <p:cNvPr id="2" name="Slide Image Placeholder 1"/>
-          <p:cNvSpPr>
-            <a:spLocks noGrp="1" noRot="1" noChangeAspect="1"/>
-          </p:cNvSpPr>
-          <p:nvPr>
-            <p:ph type="sldImg"/>
-          </p:nvPr>
-        </p:nvSpPr>
-        <p:spPr/>
-      </p:sp>
-      <p:sp>
-        <p:nvSpPr>
-          <p:cNvPr id="3" name="Notes Placeholder 2"/>
-          <p:cNvSpPr>
-            <a:spLocks noGrp="1"/>
-          </p:cNvSpPr>
-          <p:nvPr>
-            <p:ph type="body" idx="1"/>
-          </p:nvPr>
-        </p:nvSpPr>
-        <p:spPr/>
-        <p:txBody>
-          <a:bodyPr/>
-          <a:lstStyle/>
-          <a:p>
-            <a:r>
-              <a:rPr lang="en-US" dirty="0"/>
-              <a:t>Any final</a:t>
-            </a:r>
-            <a:r>
-              <a:rPr lang="en-US" baseline="0" dirty="0"/>
-              <a:t> things you want to tell us</a:t>
-            </a:r>
-            <a:endParaRPr lang="en-US" dirty="0"/>
-          </a:p>
-        </p:txBody>
-      </p:sp>
-      <p:sp>
-        <p:nvSpPr>
-          <p:cNvPr id="4" name="Slide Number Placeholder 3"/>
-          <p:cNvSpPr>
-            <a:spLocks noGrp="1"/>
-          </p:cNvSpPr>
-          <p:nvPr>
-            <p:ph type="sldNum" sz="quarter" idx="10"/>
-          </p:nvPr>
-        </p:nvSpPr>
-        <p:spPr/>
-        <p:txBody>
-          <a:bodyPr/>
-          <a:lstStyle/>
-          <a:p>
-            <a:fld id="{A008DDF4-253B-4E36-BE28-46B8E6426B7B}" type="slidenum">
-              <a:rPr lang="en-US" smtClean="0"/>
-              <a:t>10</a:t>
-            </a:fld>
-            <a:endParaRPr lang="en-US"/>
-          </a:p>
-        </p:txBody>
-      </p:sp>
-    </p:spTree>
-    <p:extLst>
-      <p:ext uri="{BB962C8B-B14F-4D97-AF65-F5344CB8AC3E}">
-        <p14:creationId xmlns:p14="http://schemas.microsoft.com/office/powerpoint/2010/main" val="3392905823"/>
+        <p14:creationId xmlns:p14="http://schemas.microsoft.com/office/powerpoint/2010/main" val="3777378702"/>
       </p:ext>
     </p:extLst>
   </p:cSld>
@@ -1427,7 +1236,7 @@
           <a:p>
             <a:fld id="{4BFC623A-4806-45FB-9E07-894B153158FF}" type="datetimeFigureOut">
               <a:rPr lang="en-US" smtClean="0"/>
-              <a:t>11/19/2016</a:t>
+              <a:t>11/25/2016</a:t>
             </a:fld>
             <a:endParaRPr lang="en-US"/>
           </a:p>
@@ -1633,7 +1442,7 @@
           <a:p>
             <a:fld id="{4BFC623A-4806-45FB-9E07-894B153158FF}" type="datetimeFigureOut">
               <a:rPr lang="en-US" smtClean="0"/>
-              <a:t>11/19/2016</a:t>
+              <a:t>11/25/2016</a:t>
             </a:fld>
             <a:endParaRPr lang="en-US"/>
           </a:p>
@@ -1883,7 +1692,7 @@
           <a:p>
             <a:fld id="{4BFC623A-4806-45FB-9E07-894B153158FF}" type="datetimeFigureOut">
               <a:rPr lang="en-US" smtClean="0"/>
-              <a:t>11/19/2016</a:t>
+              <a:t>11/25/2016</a:t>
             </a:fld>
             <a:endParaRPr lang="en-US"/>
           </a:p>
@@ -2119,7 +1928,7 @@
           <a:p>
             <a:fld id="{4BFC623A-4806-45FB-9E07-894B153158FF}" type="datetimeFigureOut">
               <a:rPr lang="en-US" smtClean="0"/>
-              <a:t>11/19/2016</a:t>
+              <a:t>11/25/2016</a:t>
             </a:fld>
             <a:endParaRPr lang="en-US"/>
           </a:p>
@@ -2236,7 +2045,7 @@
           <a:p>
             <a:fld id="{4BFC623A-4806-45FB-9E07-894B153158FF}" type="datetimeFigureOut">
               <a:rPr lang="en-US" smtClean="0"/>
-              <a:t>11/19/2016</a:t>
+              <a:t>11/25/2016</a:t>
             </a:fld>
             <a:endParaRPr lang="en-US"/>
           </a:p>
@@ -2341,7 +2150,7 @@
           <a:p>
             <a:fld id="{4BFC623A-4806-45FB-9E07-894B153158FF}" type="datetimeFigureOut">
               <a:rPr lang="en-US" smtClean="0"/>
-              <a:t>11/19/2016</a:t>
+              <a:t>11/25/2016</a:t>
             </a:fld>
             <a:endParaRPr lang="en-US"/>
           </a:p>
@@ -2626,7 +2435,7 @@
           <a:p>
             <a:fld id="{4BFC623A-4806-45FB-9E07-894B153158FF}" type="datetimeFigureOut">
               <a:rPr lang="en-US" smtClean="0"/>
-              <a:t>11/19/2016</a:t>
+              <a:t>11/25/2016</a:t>
             </a:fld>
             <a:endParaRPr lang="en-US"/>
           </a:p>
@@ -2857,7 +2666,7 @@
           <a:p>
             <a:fld id="{4BFC623A-4806-45FB-9E07-894B153158FF}" type="datetimeFigureOut">
               <a:rPr lang="en-US" smtClean="0"/>
-              <a:t>11/19/2016</a:t>
+              <a:t>11/25/2016</a:t>
             </a:fld>
             <a:endParaRPr lang="en-US"/>
           </a:p>
@@ -3260,126 +3069,110 @@
       </p:grpSpPr>
       <p:sp>
         <p:nvSpPr>
-          <p:cNvPr id="2" name="TextBox 1"/>
-          <p:cNvSpPr txBox="1"/>
-          <p:nvPr/>
+          <p:cNvPr id="2" name="Title 1"/>
+          <p:cNvSpPr>
+            <a:spLocks noGrp="1"/>
+          </p:cNvSpPr>
+          <p:nvPr>
+            <p:ph type="ctrTitle"/>
+          </p:nvPr>
         </p:nvSpPr>
         <p:spPr>
           <a:xfrm>
-            <a:off x="739036" y="613775"/>
-            <a:ext cx="10308920" cy="923330"/>
+            <a:off x="1524000" y="1122363"/>
+            <a:ext cx="9144000" cy="1689848"/>
+          </a:xfrm>
+        </p:spPr>
+        <p:txBody>
+          <a:bodyPr/>
+          <a:lstStyle/>
+          <a:p>
+            <a:r>
+              <a:rPr lang="en-US" dirty="0" smtClean="0">
+                <a:latin typeface="Segoe UI Light" panose="020B0502040204020203" pitchFamily="34" charset="0"/>
+                <a:cs typeface="Segoe UI Light" panose="020B0502040204020203" pitchFamily="34" charset="0"/>
+              </a:rPr>
+              <a:t>Contoso Bank</a:t>
+            </a:r>
+            <a:endParaRPr lang="en-US" dirty="0">
+              <a:latin typeface="Segoe UI Light" panose="020B0502040204020203" pitchFamily="34" charset="0"/>
+              <a:cs typeface="Segoe UI Light" panose="020B0502040204020203" pitchFamily="34" charset="0"/>
+            </a:endParaRPr>
+          </a:p>
+        </p:txBody>
+      </p:sp>
+      <p:sp>
+        <p:nvSpPr>
+          <p:cNvPr id="3" name="Subtitle 2"/>
+          <p:cNvSpPr>
+            <a:spLocks noGrp="1"/>
+          </p:cNvSpPr>
+          <p:nvPr>
+            <p:ph type="subTitle" idx="1"/>
+          </p:nvPr>
+        </p:nvSpPr>
+        <p:spPr/>
+        <p:txBody>
+          <a:bodyPr/>
+          <a:lstStyle/>
+          <a:p>
+            <a:pPr algn="l"/>
+            <a:r>
+              <a:rPr lang="en-US" dirty="0" smtClean="0"/>
+              <a:t>Ciarah Desiree Suligan</a:t>
+            </a:r>
+            <a:endParaRPr lang="en-US" dirty="0">
+              <a:latin typeface="Segoe UI Light" panose="020B0502040204020203" pitchFamily="34" charset="0"/>
+              <a:cs typeface="Segoe UI Light" panose="020B0502040204020203" pitchFamily="34" charset="0"/>
+            </a:endParaRPr>
+          </a:p>
+          <a:p>
+            <a:pPr algn="l"/>
+            <a:r>
+              <a:rPr lang="en-US" dirty="0" smtClean="0"/>
+              <a:t>ciarahsuligan@outlook.co.nz</a:t>
+            </a:r>
+            <a:endParaRPr lang="en-US" dirty="0">
+              <a:latin typeface="Segoe UI Light" panose="020B0502040204020203" pitchFamily="34" charset="0"/>
+              <a:cs typeface="Segoe UI Light" panose="020B0502040204020203" pitchFamily="34" charset="0"/>
+            </a:endParaRPr>
+          </a:p>
+        </p:txBody>
+      </p:sp>
+      <p:pic>
+        <p:nvPicPr>
+          <p:cNvPr id="4" name="Picture 3"/>
+          <p:cNvPicPr>
+            <a:picLocks noChangeAspect="1"/>
+          </p:cNvPicPr>
+          <p:nvPr/>
+        </p:nvPicPr>
+        <p:blipFill>
+          <a:blip r:embed="rId3">
+            <a:extLst>
+              <a:ext uri="{28A0092B-C50C-407E-A947-70E740481C1C}">
+                <a14:useLocalDpi xmlns:a14="http://schemas.microsoft.com/office/drawing/2010/main" val="0"/>
+              </a:ext>
+            </a:extLst>
+          </a:blip>
+          <a:stretch>
+            <a:fillRect/>
+          </a:stretch>
+        </p:blipFill>
+        <p:spPr>
+          <a:xfrm>
+            <a:off x="8870640" y="2847181"/>
+            <a:ext cx="2318009" cy="2318009"/>
           </a:xfrm>
           <a:prstGeom prst="rect">
             <a:avLst/>
           </a:prstGeom>
-          <a:noFill/>
         </p:spPr>
-        <p:txBody>
-          <a:bodyPr wrap="square" rtlCol="0">
-            <a:spAutoFit/>
-          </a:bodyPr>
-          <a:lstStyle/>
-          <a:p>
-            <a:r>
-              <a:rPr lang="en-NZ" dirty="0"/>
-              <a:t>Instructions:</a:t>
-            </a:r>
-          </a:p>
-          <a:p>
-            <a:endParaRPr lang="en-NZ" dirty="0"/>
-          </a:p>
-          <a:p>
-            <a:r>
-              <a:rPr lang="en-NZ" dirty="0"/>
-              <a:t>You may change these slides as you see fit. You may add or remove slides. </a:t>
-            </a:r>
-          </a:p>
-        </p:txBody>
-      </p:sp>
+      </p:pic>
     </p:spTree>
     <p:extLst>
       <p:ext uri="{BB962C8B-B14F-4D97-AF65-F5344CB8AC3E}">
-        <p14:creationId xmlns:p14="http://schemas.microsoft.com/office/powerpoint/2010/main" val="742754185"/>
-      </p:ext>
-    </p:extLst>
-  </p:cSld>
-  <p:clrMapOvr>
-    <a:masterClrMapping/>
-  </p:clrMapOvr>
-</p:sld>
-</file>
-
-<file path=ppt/slides/slide10.xml><?xml version="1.0" encoding="utf-8"?>
-<p:sld xmlns:a="http://schemas.openxmlformats.org/drawingml/2006/main" xmlns:r="http://schemas.openxmlformats.org/officeDocument/2006/relationships" xmlns:p="http://schemas.openxmlformats.org/presentationml/2006/main">
-  <p:cSld>
-    <p:spTree>
-      <p:nvGrpSpPr>
-        <p:cNvPr id="1" name=""/>
-        <p:cNvGrpSpPr/>
-        <p:nvPr/>
-      </p:nvGrpSpPr>
-      <p:grpSpPr>
-        <a:xfrm>
-          <a:off x="0" y="0"/>
-          <a:ext cx="0" cy="0"/>
-          <a:chOff x="0" y="0"/>
-          <a:chExt cx="0" cy="0"/>
-        </a:xfrm>
-      </p:grpSpPr>
-      <p:sp>
-        <p:nvSpPr>
-          <p:cNvPr id="2" name="Title 1"/>
-          <p:cNvSpPr>
-            <a:spLocks noGrp="1"/>
-          </p:cNvSpPr>
-          <p:nvPr>
-            <p:ph type="title"/>
-          </p:nvPr>
-        </p:nvSpPr>
-        <p:spPr/>
-        <p:txBody>
-          <a:bodyPr/>
-          <a:lstStyle/>
-          <a:p>
-            <a:r>
-              <a:rPr lang="en-US" dirty="0">
-                <a:latin typeface="Segoe UI Light" panose="020B0502040204020203" pitchFamily="34" charset="0"/>
-                <a:cs typeface="Segoe UI Light" panose="020B0502040204020203" pitchFamily="34" charset="0"/>
-              </a:rPr>
-              <a:t>Final Comments</a:t>
-            </a:r>
-          </a:p>
-        </p:txBody>
-      </p:sp>
-      <p:sp>
-        <p:nvSpPr>
-          <p:cNvPr id="3" name="Subtitle 2"/>
-          <p:cNvSpPr>
-            <a:spLocks noGrp="1"/>
-          </p:cNvSpPr>
-          <p:nvPr>
-            <p:ph idx="1"/>
-          </p:nvPr>
-        </p:nvSpPr>
-        <p:spPr/>
-        <p:txBody>
-          <a:bodyPr/>
-          <a:lstStyle/>
-          <a:p>
-            <a:pPr marL="0" indent="0">
-              <a:buNone/>
-            </a:pPr>
-            <a:endParaRPr lang="en-US" dirty="0">
-              <a:latin typeface="Segoe UI Light" panose="020B0502040204020203" pitchFamily="34" charset="0"/>
-              <a:cs typeface="Segoe UI Light" panose="020B0502040204020203" pitchFamily="34" charset="0"/>
-            </a:endParaRPr>
-          </a:p>
-        </p:txBody>
-      </p:sp>
-    </p:spTree>
-    <p:extLst>
-      <p:ext uri="{BB962C8B-B14F-4D97-AF65-F5344CB8AC3E}">
-        <p14:creationId xmlns:p14="http://schemas.microsoft.com/office/powerpoint/2010/main" val="1095715971"/>
+        <p14:creationId xmlns:p14="http://schemas.microsoft.com/office/powerpoint/2010/main" val="1666508604"/>
       </p:ext>
     </p:extLst>
   </p:cSld>
@@ -3413,7 +3206,7 @@
             <a:spLocks noGrp="1"/>
           </p:cNvSpPr>
           <p:nvPr>
-            <p:ph type="ctrTitle"/>
+            <p:ph type="title"/>
           </p:nvPr>
         </p:nvSpPr>
         <p:spPr/>
@@ -3421,56 +3214,298 @@
           <a:bodyPr/>
           <a:lstStyle/>
           <a:p>
+            <a:r>
+              <a:rPr lang="en-US" dirty="0" smtClean="0">
+                <a:latin typeface="Segoe UI Light" panose="020B0502040204020203" pitchFamily="34" charset="0"/>
+                <a:cs typeface="Segoe UI Light" panose="020B0502040204020203" pitchFamily="34" charset="0"/>
+              </a:rPr>
+              <a:t>Personal Info </a:t>
+            </a:r>
+            <a:r>
+              <a:rPr lang="en-US" dirty="0" smtClean="0">
+                <a:latin typeface="Segoe UI Light" panose="020B0502040204020203" pitchFamily="34" charset="0"/>
+                <a:cs typeface="Segoe UI Light" panose="020B0502040204020203" pitchFamily="34" charset="0"/>
+                <a:sym typeface="Wingdings" panose="05000000000000000000" pitchFamily="2" charset="2"/>
+              </a:rPr>
+              <a:t></a:t>
+            </a:r>
+            <a:endParaRPr lang="en-US" dirty="0">
+              <a:latin typeface="Segoe UI Light" panose="020B0502040204020203" pitchFamily="34" charset="0"/>
+              <a:cs typeface="Segoe UI Light" panose="020B0502040204020203" pitchFamily="34" charset="0"/>
+            </a:endParaRPr>
+          </a:p>
+        </p:txBody>
+      </p:sp>
+      <p:sp>
+        <p:nvSpPr>
+          <p:cNvPr id="3" name="Subtitle 2"/>
+          <p:cNvSpPr>
+            <a:spLocks noGrp="1"/>
+          </p:cNvSpPr>
+          <p:nvPr>
+            <p:ph idx="1"/>
+          </p:nvPr>
+        </p:nvSpPr>
+        <p:spPr>
+          <a:xfrm>
+            <a:off x="838200" y="1618378"/>
+            <a:ext cx="10515600" cy="4351338"/>
+          </a:xfrm>
+        </p:spPr>
+        <p:txBody>
+          <a:bodyPr/>
+          <a:lstStyle/>
+          <a:p>
+            <a:r>
+              <a:rPr lang="en-US" dirty="0" smtClean="0"/>
+              <a:t>Bachelor of Technology (Hons) – IT at </a:t>
+            </a:r>
+            <a:r>
+              <a:rPr lang="en-US" dirty="0" err="1" smtClean="0"/>
+              <a:t>UoA</a:t>
+            </a:r>
+            <a:endParaRPr lang="en-US" dirty="0"/>
+          </a:p>
+          <a:p>
+            <a:r>
+              <a:rPr lang="en-US" dirty="0" smtClean="0"/>
+              <a:t>Watching movies and American TV shows (Suits)</a:t>
+            </a:r>
+            <a:endParaRPr lang="en-US" dirty="0">
+              <a:latin typeface="Segoe UI Light" panose="020B0502040204020203" pitchFamily="34" charset="0"/>
+              <a:cs typeface="Segoe UI Light" panose="020B0502040204020203" pitchFamily="34" charset="0"/>
+            </a:endParaRPr>
+          </a:p>
+          <a:p>
+            <a:pPr algn="l"/>
+            <a:r>
+              <a:rPr lang="en-US" dirty="0" smtClean="0">
+                <a:latin typeface="Segoe UI Light" panose="020B0502040204020203" pitchFamily="34" charset="0"/>
+                <a:cs typeface="Segoe UI Light" panose="020B0502040204020203" pitchFamily="34" charset="0"/>
+              </a:rPr>
+              <a:t>Best </a:t>
+            </a:r>
             <a:r>
               <a:rPr lang="en-US" dirty="0">
                 <a:latin typeface="Segoe UI Light" panose="020B0502040204020203" pitchFamily="34" charset="0"/>
                 <a:cs typeface="Segoe UI Light" panose="020B0502040204020203" pitchFamily="34" charset="0"/>
               </a:rPr>
-              <a:t>&lt;Name of Project&gt;</a:t>
-            </a:r>
-          </a:p>
-        </p:txBody>
-      </p:sp>
-      <p:sp>
-        <p:nvSpPr>
-          <p:cNvPr id="3" name="Subtitle 2"/>
-          <p:cNvSpPr>
-            <a:spLocks noGrp="1"/>
-          </p:cNvSpPr>
-          <p:nvPr>
-            <p:ph type="subTitle" idx="1"/>
-          </p:nvPr>
-        </p:nvSpPr>
-        <p:spPr/>
-        <p:txBody>
-          <a:bodyPr/>
-          <a:lstStyle/>
-          <a:p>
-            <a:pPr algn="l"/>
-            <a:r>
-              <a:rPr lang="en-US" dirty="0">
+              <a:t>part of </a:t>
+            </a:r>
+            <a:r>
+              <a:rPr lang="en-US" dirty="0" smtClean="0">
                 <a:latin typeface="Segoe UI Light" panose="020B0502040204020203" pitchFamily="34" charset="0"/>
                 <a:cs typeface="Segoe UI Light" panose="020B0502040204020203" pitchFamily="34" charset="0"/>
               </a:rPr>
-              <a:t>&lt;Your Name&gt;</a:t>
-            </a:r>
+              <a:t>MSA – BOTS</a:t>
+            </a:r>
+            <a:endParaRPr lang="en-US" dirty="0">
+              <a:latin typeface="Segoe UI Light" panose="020B0502040204020203" pitchFamily="34" charset="0"/>
+              <a:cs typeface="Segoe UI Light" panose="020B0502040204020203" pitchFamily="34" charset="0"/>
+            </a:endParaRPr>
           </a:p>
           <a:p>
             <a:pPr algn="l"/>
             <a:r>
+              <a:rPr lang="en-US" dirty="0" smtClean="0"/>
+              <a:t>Set up instructions uploaded before training.</a:t>
+            </a:r>
+            <a:endParaRPr lang="en-US" dirty="0">
+              <a:latin typeface="Segoe UI Light" panose="020B0502040204020203" pitchFamily="34" charset="0"/>
+              <a:cs typeface="Segoe UI Light" panose="020B0502040204020203" pitchFamily="34" charset="0"/>
+            </a:endParaRPr>
+          </a:p>
+        </p:txBody>
+      </p:sp>
+      <p:sp>
+        <p:nvSpPr>
+          <p:cNvPr id="4" name="TextBox 3"/>
+          <p:cNvSpPr txBox="1"/>
+          <p:nvPr/>
+        </p:nvSpPr>
+        <p:spPr>
+          <a:xfrm>
+            <a:off x="2882900" y="6261100"/>
+            <a:ext cx="7213600" cy="646331"/>
+          </a:xfrm>
+          <a:prstGeom prst="rect">
+            <a:avLst/>
+          </a:prstGeom>
+          <a:noFill/>
+        </p:spPr>
+        <p:txBody>
+          <a:bodyPr wrap="square" rtlCol="0">
+            <a:spAutoFit/>
+          </a:bodyPr>
+          <a:lstStyle/>
+          <a:p>
+            <a:r>
               <a:rPr lang="en-US" dirty="0">
-                <a:latin typeface="Segoe UI Light" panose="020B0502040204020203" pitchFamily="34" charset="0"/>
-                <a:cs typeface="Segoe UI Light" panose="020B0502040204020203" pitchFamily="34" charset="0"/>
+                <a:solidFill>
+                  <a:schemeClr val="bg1"/>
+                </a:solidFill>
               </a:rPr>
-              <a:t>&lt;MSA Email Address&gt;</a:t>
-            </a:r>
-          </a:p>
-        </p:txBody>
-      </p:sp>
+              <a:t>This section is NOT assessed. We just want to get to know</a:t>
+            </a:r>
+            <a:r>
+              <a:rPr lang="en-US" baseline="0" dirty="0">
+                <a:solidFill>
+                  <a:schemeClr val="bg1"/>
+                </a:solidFill>
+              </a:rPr>
+              <a:t> you </a:t>
+            </a:r>
+            <a:r>
+              <a:rPr lang="en-US" baseline="0" dirty="0">
+                <a:solidFill>
+                  <a:schemeClr val="bg1"/>
+                </a:solidFill>
+                <a:sym typeface="Wingdings" panose="05000000000000000000" pitchFamily="2" charset="2"/>
+              </a:rPr>
+              <a:t>.</a:t>
+            </a:r>
+            <a:endParaRPr lang="en-US" dirty="0">
+              <a:solidFill>
+                <a:schemeClr val="bg1"/>
+              </a:solidFill>
+            </a:endParaRPr>
+          </a:p>
+          <a:p>
+            <a:endParaRPr lang="en-US" dirty="0">
+              <a:solidFill>
+                <a:schemeClr val="bg1"/>
+              </a:solidFill>
+            </a:endParaRPr>
+          </a:p>
+        </p:txBody>
+      </p:sp>
+      <p:pic>
+        <p:nvPicPr>
+          <p:cNvPr id="1026" name="Picture 2" descr="http://www.dreamsare4real.com/wp-content/uploads/2016/04/arctic-139394_1280.jpg"/>
+          <p:cNvPicPr>
+            <a:picLocks noChangeAspect="1" noChangeArrowheads="1"/>
+          </p:cNvPicPr>
+          <p:nvPr/>
+        </p:nvPicPr>
+        <p:blipFill>
+          <a:blip r:embed="rId3" cstate="print">
+            <a:extLst>
+              <a:ext uri="{28A0092B-C50C-407E-A947-70E740481C1C}">
+                <a14:useLocalDpi xmlns:a14="http://schemas.microsoft.com/office/drawing/2010/main" val="0"/>
+              </a:ext>
+            </a:extLst>
+          </a:blip>
+          <a:srcRect/>
+          <a:stretch>
+            <a:fillRect/>
+          </a:stretch>
+        </p:blipFill>
+        <p:spPr bwMode="auto">
+          <a:xfrm>
+            <a:off x="8492407" y="3821321"/>
+            <a:ext cx="3327220" cy="1871562"/>
+          </a:xfrm>
+          <a:prstGeom prst="rect">
+            <a:avLst/>
+          </a:prstGeom>
+          <a:noFill/>
+          <a:extLst>
+            <a:ext uri="{909E8E84-426E-40DD-AFC4-6F175D3DCCD1}">
+              <a14:hiddenFill xmlns:a14="http://schemas.microsoft.com/office/drawing/2010/main">
+                <a:solidFill>
+                  <a:srgbClr val="FFFFFF"/>
+                </a:solidFill>
+              </a14:hiddenFill>
+            </a:ext>
+          </a:extLst>
+        </p:spPr>
+      </p:pic>
+      <p:pic>
+        <p:nvPicPr>
+          <p:cNvPr id="1028" name="Picture 4" descr="https://media.licdn.com/media/AAEAAQAAAAAAAAVqAAAAJGZlZWIxMTNkLWEwNTAtNGUyNS04NzYxLWZiYWEyM2MwYzg0OA.png"/>
+          <p:cNvPicPr>
+            <a:picLocks noChangeAspect="1" noChangeArrowheads="1"/>
+          </p:cNvPicPr>
+          <p:nvPr/>
+        </p:nvPicPr>
+        <p:blipFill>
+          <a:blip r:embed="rId4">
+            <a:extLst>
+              <a:ext uri="{28A0092B-C50C-407E-A947-70E740481C1C}">
+                <a14:useLocalDpi xmlns:a14="http://schemas.microsoft.com/office/drawing/2010/main" val="0"/>
+              </a:ext>
+            </a:extLst>
+          </a:blip>
+          <a:srcRect/>
+          <a:stretch>
+            <a:fillRect/>
+          </a:stretch>
+        </p:blipFill>
+        <p:spPr bwMode="auto">
+          <a:xfrm>
+            <a:off x="838200" y="4195586"/>
+            <a:ext cx="3405996" cy="1123031"/>
+          </a:xfrm>
+          <a:prstGeom prst="rect">
+            <a:avLst/>
+          </a:prstGeom>
+          <a:noFill/>
+          <a:extLst>
+            <a:ext uri="{909E8E84-426E-40DD-AFC4-6F175D3DCCD1}">
+              <a14:hiddenFill xmlns:a14="http://schemas.microsoft.com/office/drawing/2010/main">
+                <a:solidFill>
+                  <a:srgbClr val="FFFFFF"/>
+                </a:solidFill>
+              </a14:hiddenFill>
+            </a:ext>
+          </a:extLst>
+        </p:spPr>
+      </p:pic>
+      <p:pic>
+        <p:nvPicPr>
+          <p:cNvPr id="1030" name="Picture 6" descr="https://www.scrapesentry.com/wp-content/uploads/2014/01/different_types_of_web_bots.jpg"/>
+          <p:cNvPicPr>
+            <a:picLocks noChangeAspect="1" noChangeArrowheads="1"/>
+          </p:cNvPicPr>
+          <p:nvPr/>
+        </p:nvPicPr>
+        <p:blipFill>
+          <a:blip r:embed="rId5">
+            <a:extLst>
+              <a:ext uri="{28A0092B-C50C-407E-A947-70E740481C1C}">
+                <a14:useLocalDpi xmlns:a14="http://schemas.microsoft.com/office/drawing/2010/main" val="0"/>
+              </a:ext>
+            </a:extLst>
+          </a:blip>
+          <a:srcRect/>
+          <a:stretch>
+            <a:fillRect/>
+          </a:stretch>
+        </p:blipFill>
+        <p:spPr bwMode="auto">
+          <a:xfrm>
+            <a:off x="8492407" y="365125"/>
+            <a:ext cx="3327220" cy="2506506"/>
+          </a:xfrm>
+          <a:prstGeom prst="rect">
+            <a:avLst/>
+          </a:prstGeom>
+          <a:noFill/>
+          <a:extLst>
+            <a:ext uri="{909E8E84-426E-40DD-AFC4-6F175D3DCCD1}">
+              <a14:hiddenFill xmlns:a14="http://schemas.microsoft.com/office/drawing/2010/main">
+                <a:solidFill>
+                  <a:srgbClr val="FFFFFF"/>
+                </a:solidFill>
+              </a14:hiddenFill>
+            </a:ext>
+          </a:extLst>
+        </p:spPr>
+      </p:pic>
     </p:spTree>
     <p:extLst>
       <p:ext uri="{BB962C8B-B14F-4D97-AF65-F5344CB8AC3E}">
-        <p14:creationId xmlns:p14="http://schemas.microsoft.com/office/powerpoint/2010/main" val="1666508604"/>
+        <p14:creationId xmlns:p14="http://schemas.microsoft.com/office/powerpoint/2010/main" val="1386450005"/>
       </p:ext>
     </p:extLst>
   </p:cSld>
@@ -3509,24 +3544,92 @@
         </p:nvSpPr>
         <p:spPr/>
         <p:txBody>
-          <a:bodyPr/>
-          <a:lstStyle/>
-          <a:p>
-            <a:r>
-              <a:rPr lang="en-US" dirty="0">
+          <a:bodyPr>
+            <a:normAutofit/>
+          </a:bodyPr>
+          <a:lstStyle/>
+          <a:p>
+            <a:r>
+              <a:rPr lang="en-US" sz="4000" dirty="0" smtClean="0"/>
+              <a:t>Currency Rates </a:t>
+            </a:r>
+            <a:r>
+              <a:rPr lang="en-US" sz="4000" dirty="0" smtClean="0"/>
+              <a:t>API – Fixer.io</a:t>
+            </a:r>
+            <a:endParaRPr lang="en-US" sz="4000" dirty="0"/>
+          </a:p>
+        </p:txBody>
+      </p:sp>
+      <p:sp>
+        <p:nvSpPr>
+          <p:cNvPr id="3" name="Subtitle 2"/>
+          <p:cNvSpPr>
+            <a:spLocks noGrp="1"/>
+          </p:cNvSpPr>
+          <p:nvPr>
+            <p:ph idx="1"/>
+          </p:nvPr>
+        </p:nvSpPr>
+        <p:spPr>
+          <a:xfrm>
+            <a:off x="838200" y="1518249"/>
+            <a:ext cx="10515600" cy="4658715"/>
+          </a:xfrm>
+        </p:spPr>
+        <p:txBody>
+          <a:bodyPr/>
+          <a:lstStyle/>
+          <a:p>
+            <a:r>
+              <a:rPr lang="en-US" dirty="0" smtClean="0">
                 <a:latin typeface="Segoe UI Light" panose="020B0502040204020203" pitchFamily="34" charset="0"/>
                 <a:cs typeface="Segoe UI Light" panose="020B0502040204020203" pitchFamily="34" charset="0"/>
               </a:rPr>
-              <a:t>A bit about yourself </a:t>
-            </a:r>
-            <a:r>
-              <a:rPr lang="en-US" dirty="0">
-                <a:latin typeface="Segoe UI Light" panose="020B0502040204020203" pitchFamily="34" charset="0"/>
-                <a:cs typeface="Segoe UI Light" panose="020B0502040204020203" pitchFamily="34" charset="0"/>
-                <a:sym typeface="Wingdings" panose="05000000000000000000" pitchFamily="2" charset="2"/>
-              </a:rPr>
-              <a:t> </a:t>
-            </a:r>
+              <a:t>No key required</a:t>
+            </a:r>
+          </a:p>
+          <a:p>
+            <a:r>
+              <a:rPr lang="en-US" dirty="0" smtClean="0"/>
+              <a:t>JSON format</a:t>
+            </a:r>
+            <a:endParaRPr lang="en-US" dirty="0" smtClean="0">
+              <a:latin typeface="Segoe UI Light" panose="020B0502040204020203" pitchFamily="34" charset="0"/>
+              <a:cs typeface="Segoe UI Light" panose="020B0502040204020203" pitchFamily="34" charset="0"/>
+            </a:endParaRPr>
+          </a:p>
+          <a:p>
+            <a:r>
+              <a:rPr lang="en-NZ" dirty="0" smtClean="0"/>
+              <a:t>Rates published </a:t>
+            </a:r>
+            <a:r>
+              <a:rPr lang="en-NZ" dirty="0"/>
+              <a:t>by the </a:t>
+            </a:r>
+            <a:r>
+              <a:rPr lang="en-NZ" dirty="0" smtClean="0"/>
+              <a:t>European </a:t>
+            </a:r>
+            <a:r>
+              <a:rPr lang="en-NZ" dirty="0"/>
+              <a:t>Central </a:t>
+            </a:r>
+            <a:r>
+              <a:rPr lang="en-NZ" dirty="0" smtClean="0"/>
+              <a:t>Bank</a:t>
+            </a:r>
+            <a:r>
+              <a:rPr lang="en-NZ" dirty="0"/>
+              <a:t> </a:t>
+            </a:r>
+            <a:r>
+              <a:rPr lang="en-NZ" dirty="0" smtClean="0"/>
+              <a:t>(Contoso Bank is located in Geneva, Switzerland)</a:t>
+            </a:r>
+          </a:p>
+          <a:p>
             <a:endParaRPr lang="en-US" dirty="0">
               <a:latin typeface="Segoe UI Light" panose="020B0502040204020203" pitchFamily="34" charset="0"/>
               <a:cs typeface="Segoe UI Light" panose="020B0502040204020203" pitchFamily="34" charset="0"/>
@@ -3534,137 +3637,81 @@
           </a:p>
         </p:txBody>
       </p:sp>
-      <p:sp>
-        <p:nvSpPr>
-          <p:cNvPr id="3" name="Subtitle 2"/>
-          <p:cNvSpPr>
-            <a:spLocks noGrp="1"/>
-          </p:cNvSpPr>
-          <p:nvPr>
-            <p:ph idx="1"/>
-          </p:nvPr>
-        </p:nvSpPr>
-        <p:spPr/>
-        <p:txBody>
-          <a:bodyPr/>
-          <a:lstStyle/>
-          <a:p>
-            <a:r>
-              <a:rPr lang="en-US" dirty="0">
-                <a:latin typeface="Segoe UI Light" panose="020B0502040204020203" pitchFamily="34" charset="0"/>
-                <a:cs typeface="Segoe UI Light" panose="020B0502040204020203" pitchFamily="34" charset="0"/>
-              </a:rPr>
-              <a:t>What your interests / hobbies are</a:t>
-            </a:r>
-          </a:p>
-          <a:p>
-            <a:pPr algn="l"/>
-            <a:r>
-              <a:rPr lang="en-US" dirty="0">
-                <a:latin typeface="Segoe UI Light" panose="020B0502040204020203" pitchFamily="34" charset="0"/>
-                <a:cs typeface="Segoe UI Light" panose="020B0502040204020203" pitchFamily="34" charset="0"/>
-              </a:rPr>
-              <a:t>What you are studying</a:t>
-            </a:r>
-          </a:p>
-          <a:p>
-            <a:pPr algn="l"/>
-            <a:r>
-              <a:rPr lang="en-US" dirty="0">
-                <a:latin typeface="Segoe UI Light" panose="020B0502040204020203" pitchFamily="34" charset="0"/>
-                <a:cs typeface="Segoe UI Light" panose="020B0502040204020203" pitchFamily="34" charset="0"/>
-              </a:rPr>
-              <a:t>Best part of MSA</a:t>
-            </a:r>
-          </a:p>
-          <a:p>
-            <a:pPr algn="l"/>
-            <a:r>
-              <a:rPr lang="en-US" dirty="0">
-                <a:latin typeface="Segoe UI Light" panose="020B0502040204020203" pitchFamily="34" charset="0"/>
-                <a:cs typeface="Segoe UI Light" panose="020B0502040204020203" pitchFamily="34" charset="0"/>
-              </a:rPr>
-              <a:t>What we could improve</a:t>
-            </a:r>
-          </a:p>
-          <a:p>
-            <a:pPr algn="l"/>
-            <a:r>
-              <a:rPr lang="en-US" dirty="0">
-                <a:latin typeface="Segoe UI Light" panose="020B0502040204020203" pitchFamily="34" charset="0"/>
-                <a:cs typeface="Segoe UI Light" panose="020B0502040204020203" pitchFamily="34" charset="0"/>
-              </a:rPr>
-              <a:t>Future Goals</a:t>
-            </a:r>
-          </a:p>
-        </p:txBody>
-      </p:sp>
-      <p:sp>
-        <p:nvSpPr>
-          <p:cNvPr id="4" name="TextBox 3"/>
-          <p:cNvSpPr txBox="1"/>
+      <p:pic>
+        <p:nvPicPr>
+          <p:cNvPr id="4" name="Picture 3"/>
+          <p:cNvPicPr>
+            <a:picLocks noChangeAspect="1"/>
+          </p:cNvPicPr>
           <p:nvPr/>
-        </p:nvSpPr>
+        </p:nvPicPr>
+        <p:blipFill>
+          <a:blip r:embed="rId3"/>
+          <a:stretch>
+            <a:fillRect/>
+          </a:stretch>
+        </p:blipFill>
         <p:spPr>
           <a:xfrm>
-            <a:off x="2882900" y="6261100"/>
-            <a:ext cx="7213600" cy="646331"/>
+            <a:off x="3767194" y="3462803"/>
+            <a:ext cx="3802203" cy="2225277"/>
           </a:xfrm>
           <a:prstGeom prst="rect">
             <a:avLst/>
           </a:prstGeom>
-          <a:noFill/>
         </p:spPr>
-        <p:txBody>
-          <a:bodyPr wrap="square" rtlCol="0">
-            <a:spAutoFit/>
-          </a:bodyPr>
-          <a:lstStyle/>
-          <a:p>
-            <a:r>
-              <a:rPr lang="en-US" dirty="0">
-                <a:solidFill>
-                  <a:schemeClr val="bg1"/>
-                </a:solidFill>
-              </a:rPr>
-              <a:t>This section is NOT assessed. We just want to get to know</a:t>
-            </a:r>
-            <a:r>
-              <a:rPr lang="en-US" baseline="0" dirty="0">
-                <a:solidFill>
-                  <a:schemeClr val="bg1"/>
-                </a:solidFill>
-              </a:rPr>
-              <a:t> you </a:t>
-            </a:r>
-            <a:r>
-              <a:rPr lang="en-US" baseline="0" dirty="0">
-                <a:solidFill>
-                  <a:schemeClr val="bg1"/>
-                </a:solidFill>
-                <a:sym typeface="Wingdings" panose="05000000000000000000" pitchFamily="2" charset="2"/>
-              </a:rPr>
-              <a:t>.</a:t>
-            </a:r>
-            <a:endParaRPr lang="en-US" dirty="0">
-              <a:solidFill>
-                <a:schemeClr val="bg1"/>
-              </a:solidFill>
-            </a:endParaRPr>
-          </a:p>
-          <a:p>
-            <a:endParaRPr lang="en-US" dirty="0">
-              <a:solidFill>
-                <a:schemeClr val="bg1"/>
-              </a:solidFill>
-            </a:endParaRPr>
-          </a:p>
-        </p:txBody>
-      </p:sp>
+      </p:pic>
+      <p:pic>
+        <p:nvPicPr>
+          <p:cNvPr id="5" name="Picture 4"/>
+          <p:cNvPicPr>
+            <a:picLocks noChangeAspect="1"/>
+          </p:cNvPicPr>
+          <p:nvPr/>
+        </p:nvPicPr>
+        <p:blipFill>
+          <a:blip r:embed="rId4"/>
+          <a:stretch>
+            <a:fillRect/>
+          </a:stretch>
+        </p:blipFill>
+        <p:spPr>
+          <a:xfrm>
+            <a:off x="8648700" y="649254"/>
+            <a:ext cx="2705100" cy="1285875"/>
+          </a:xfrm>
+          <a:prstGeom prst="rect">
+            <a:avLst/>
+          </a:prstGeom>
+        </p:spPr>
+      </p:pic>
+      <p:pic>
+        <p:nvPicPr>
+          <p:cNvPr id="7" name="Picture 6"/>
+          <p:cNvPicPr>
+            <a:picLocks noChangeAspect="1"/>
+          </p:cNvPicPr>
+          <p:nvPr/>
+        </p:nvPicPr>
+        <p:blipFill rotWithShape="1">
+          <a:blip r:embed="rId5"/>
+          <a:srcRect r="49570" b="26332"/>
+          <a:stretch/>
+        </p:blipFill>
+        <p:spPr>
+          <a:xfrm>
+            <a:off x="7793686" y="3462804"/>
+            <a:ext cx="3560114" cy="2225277"/>
+          </a:xfrm>
+          <a:prstGeom prst="rect">
+            <a:avLst/>
+          </a:prstGeom>
+        </p:spPr>
+      </p:pic>
     </p:spTree>
     <p:extLst>
       <p:ext uri="{BB962C8B-B14F-4D97-AF65-F5344CB8AC3E}">
-        <p14:creationId xmlns:p14="http://schemas.microsoft.com/office/powerpoint/2010/main" val="1386450005"/>
+        <p14:creationId xmlns:p14="http://schemas.microsoft.com/office/powerpoint/2010/main" val="276898515"/>
       </p:ext>
     </p:extLst>
   </p:cSld>
@@ -3703,57 +3750,122 @@
         </p:nvSpPr>
         <p:spPr/>
         <p:txBody>
-          <a:bodyPr/>
-          <a:lstStyle/>
-          <a:p>
-            <a:r>
-              <a:rPr lang="en-US" dirty="0">
+          <a:bodyPr>
+            <a:normAutofit/>
+          </a:bodyPr>
+          <a:lstStyle/>
+          <a:p>
+            <a:r>
+              <a:rPr lang="en-US" sz="3600" dirty="0">
                 <a:latin typeface="Segoe UI Light" panose="020B0502040204020203" pitchFamily="34" charset="0"/>
                 <a:cs typeface="Segoe UI Light" panose="020B0502040204020203" pitchFamily="34" charset="0"/>
               </a:rPr>
-              <a:t>User Experience</a:t>
-            </a:r>
-          </a:p>
-        </p:txBody>
-      </p:sp>
-      <p:sp>
-        <p:nvSpPr>
-          <p:cNvPr id="3" name="Subtitle 2"/>
-          <p:cNvSpPr>
-            <a:spLocks noGrp="1"/>
-          </p:cNvSpPr>
-          <p:nvPr>
-            <p:ph idx="1"/>
-          </p:nvPr>
-        </p:nvSpPr>
-        <p:spPr/>
-        <p:txBody>
-          <a:bodyPr/>
-          <a:lstStyle/>
-          <a:p>
-            <a:r>
-              <a:rPr lang="en-US" dirty="0">
+              <a:t>User </a:t>
+            </a:r>
+            <a:r>
+              <a:rPr lang="en-US" sz="3600" dirty="0" smtClean="0">
                 <a:latin typeface="Segoe UI Light" panose="020B0502040204020203" pitchFamily="34" charset="0"/>
                 <a:cs typeface="Segoe UI Light" panose="020B0502040204020203" pitchFamily="34" charset="0"/>
               </a:rPr>
-              <a:t>What you did and why you did it</a:t>
-            </a:r>
-          </a:p>
-          <a:p>
-            <a:r>
-              <a:rPr lang="en-US" dirty="0">
+              <a:t>Experience/Advanced Features</a:t>
+            </a:r>
+            <a:endParaRPr lang="en-US" sz="3600" dirty="0">
+              <a:latin typeface="Segoe UI Light" panose="020B0502040204020203" pitchFamily="34" charset="0"/>
+              <a:cs typeface="Segoe UI Light" panose="020B0502040204020203" pitchFamily="34" charset="0"/>
+            </a:endParaRPr>
+          </a:p>
+        </p:txBody>
+      </p:sp>
+      <p:sp>
+        <p:nvSpPr>
+          <p:cNvPr id="3" name="Subtitle 2"/>
+          <p:cNvSpPr>
+            <a:spLocks noGrp="1"/>
+          </p:cNvSpPr>
+          <p:nvPr>
+            <p:ph idx="1"/>
+          </p:nvPr>
+        </p:nvSpPr>
+        <p:spPr>
+          <a:xfrm>
+            <a:off x="838200" y="1624868"/>
+            <a:ext cx="10515600" cy="4351338"/>
+          </a:xfrm>
+        </p:spPr>
+        <p:txBody>
+          <a:bodyPr/>
+          <a:lstStyle/>
+          <a:p>
+            <a:r>
+              <a:rPr lang="en-NZ" dirty="0"/>
+              <a:t>C</a:t>
+            </a:r>
+            <a:r>
+              <a:rPr lang="en-NZ" dirty="0" smtClean="0"/>
+              <a:t>ustom bank </a:t>
+            </a:r>
+            <a:r>
+              <a:rPr lang="en-NZ" dirty="0"/>
+              <a:t>branding </a:t>
+            </a:r>
+            <a:endParaRPr lang="en-NZ" dirty="0" smtClean="0"/>
+          </a:p>
+          <a:p>
+            <a:pPr lvl="1"/>
+            <a:r>
+              <a:rPr lang="en-NZ" dirty="0" smtClean="0"/>
+              <a:t>Sense of identity (Recognisable)</a:t>
+            </a:r>
+            <a:endParaRPr lang="en-NZ" dirty="0"/>
+          </a:p>
+          <a:p>
+            <a:pPr lvl="1"/>
+            <a:r>
+              <a:rPr lang="en-NZ" dirty="0"/>
+              <a:t>M</a:t>
+            </a:r>
+            <a:r>
+              <a:rPr lang="en-NZ" dirty="0" smtClean="0"/>
+              <a:t>atches slogan - “The world’s no.1 bank.”</a:t>
+            </a:r>
+          </a:p>
+          <a:p>
+            <a:r>
+              <a:rPr lang="en-US" dirty="0" smtClean="0"/>
+              <a:t>Buttons for common commands and direct links. </a:t>
+            </a:r>
+          </a:p>
+          <a:p>
+            <a:pPr lvl="1"/>
+            <a:r>
+              <a:rPr lang="en-US" dirty="0" smtClean="0"/>
+              <a:t>Interaction other than just text</a:t>
+            </a:r>
+          </a:p>
+          <a:p>
+            <a:pPr lvl="1"/>
+            <a:r>
+              <a:rPr lang="en-US" dirty="0" smtClean="0"/>
+              <a:t>Ease of use</a:t>
+            </a:r>
+          </a:p>
+          <a:p>
+            <a:pPr lvl="1"/>
+            <a:r>
+              <a:rPr lang="en-US" dirty="0" smtClean="0"/>
+              <a:t>Efficiency</a:t>
+            </a:r>
+          </a:p>
+          <a:p>
+            <a:r>
+              <a:rPr lang="en-US" dirty="0" smtClean="0">
                 <a:latin typeface="Segoe UI Light" panose="020B0502040204020203" pitchFamily="34" charset="0"/>
                 <a:cs typeface="Segoe UI Light" panose="020B0502040204020203" pitchFamily="34" charset="0"/>
               </a:rPr>
-              <a:t>Branding, </a:t>
-            </a:r>
-            <a:r>
-              <a:rPr lang="en-US" dirty="0" err="1">
-                <a:latin typeface="Segoe UI Light" panose="020B0502040204020203" pitchFamily="34" charset="0"/>
-                <a:cs typeface="Segoe UI Light" panose="020B0502040204020203" pitchFamily="34" charset="0"/>
-              </a:rPr>
-              <a:t>etc</a:t>
-            </a:r>
+              <a:t>Cards - visual presentation</a:t>
+            </a:r>
+          </a:p>
+          <a:p>
             <a:endParaRPr lang="en-US" dirty="0">
               <a:latin typeface="Segoe UI Light" panose="020B0502040204020203" pitchFamily="34" charset="0"/>
               <a:cs typeface="Segoe UI Light" panose="020B0502040204020203" pitchFamily="34" charset="0"/>
@@ -3761,6 +3873,78 @@
           </a:p>
         </p:txBody>
       </p:sp>
+      <p:pic>
+        <p:nvPicPr>
+          <p:cNvPr id="5" name="Picture 4"/>
+          <p:cNvPicPr>
+            <a:picLocks noChangeAspect="1"/>
+          </p:cNvPicPr>
+          <p:nvPr/>
+        </p:nvPicPr>
+        <p:blipFill>
+          <a:blip r:embed="rId3"/>
+          <a:stretch>
+            <a:fillRect/>
+          </a:stretch>
+        </p:blipFill>
+        <p:spPr>
+          <a:xfrm>
+            <a:off x="8225643" y="365125"/>
+            <a:ext cx="3559477" cy="2221114"/>
+          </a:xfrm>
+          <a:prstGeom prst="rect">
+            <a:avLst/>
+          </a:prstGeom>
+        </p:spPr>
+      </p:pic>
+      <p:pic>
+        <p:nvPicPr>
+          <p:cNvPr id="6" name="Picture 5"/>
+          <p:cNvPicPr>
+            <a:picLocks noChangeAspect="1"/>
+          </p:cNvPicPr>
+          <p:nvPr/>
+        </p:nvPicPr>
+        <p:blipFill>
+          <a:blip r:embed="rId4"/>
+          <a:stretch>
+            <a:fillRect/>
+          </a:stretch>
+        </p:blipFill>
+        <p:spPr>
+          <a:xfrm>
+            <a:off x="8294834" y="2838755"/>
+            <a:ext cx="3421093" cy="3085692"/>
+          </a:xfrm>
+          <a:prstGeom prst="rect">
+            <a:avLst/>
+          </a:prstGeom>
+        </p:spPr>
+      </p:pic>
+      <p:pic>
+        <p:nvPicPr>
+          <p:cNvPr id="7" name="Picture 6"/>
+          <p:cNvPicPr>
+            <a:picLocks noChangeAspect="1"/>
+          </p:cNvPicPr>
+          <p:nvPr/>
+        </p:nvPicPr>
+        <p:blipFill>
+          <a:blip r:embed="rId5"/>
+          <a:stretch>
+            <a:fillRect/>
+          </a:stretch>
+        </p:blipFill>
+        <p:spPr>
+          <a:xfrm>
+            <a:off x="5434280" y="3573263"/>
+            <a:ext cx="2843122" cy="2402943"/>
+          </a:xfrm>
+          <a:prstGeom prst="rect">
+            <a:avLst/>
+          </a:prstGeom>
+        </p:spPr>
+      </p:pic>
     </p:spTree>
     <p:extLst>
       <p:ext uri="{BB962C8B-B14F-4D97-AF65-F5344CB8AC3E}">
@@ -3807,8 +3991,18 @@
           <a:lstStyle/>
           <a:p>
             <a:r>
-              <a:rPr lang="en-US" dirty="0"/>
-              <a:t>Databases</a:t>
+              <a:rPr lang="en-US" dirty="0">
+                <a:latin typeface="Segoe UI Light" panose="020B0502040204020203" pitchFamily="34" charset="0"/>
+                <a:cs typeface="Segoe UI Light" panose="020B0502040204020203" pitchFamily="34" charset="0"/>
+              </a:rPr>
+              <a:t>User </a:t>
+            </a:r>
+            <a:r>
+              <a:rPr lang="en-US" dirty="0" smtClean="0">
+                <a:latin typeface="Segoe UI Light" panose="020B0502040204020203" pitchFamily="34" charset="0"/>
+                <a:cs typeface="Segoe UI Light" panose="020B0502040204020203" pitchFamily="34" charset="0"/>
+              </a:rPr>
+              <a:t>Experience/Advanced Features</a:t>
             </a:r>
             <a:endParaRPr lang="en-US" dirty="0">
               <a:latin typeface="Segoe UI Light" panose="020B0502040204020203" pitchFamily="34" charset="0"/>
@@ -3827,42 +4021,88 @@
             <p:ph idx="1"/>
           </p:nvPr>
         </p:nvSpPr>
-        <p:spPr/>
-        <p:txBody>
-          <a:bodyPr/>
-          <a:lstStyle/>
+        <p:spPr>
+          <a:xfrm>
+            <a:off x="838200" y="1624868"/>
+            <a:ext cx="10515600" cy="4351338"/>
+          </a:xfrm>
+        </p:spPr>
+        <p:txBody>
+          <a:bodyPr/>
+          <a:lstStyle/>
+          <a:p>
+            <a:r>
+              <a:rPr lang="en-NZ" dirty="0" smtClean="0"/>
+              <a:t>State service </a:t>
+            </a:r>
+          </a:p>
+          <a:p>
+            <a:pPr lvl="1"/>
+            <a:r>
+              <a:rPr lang="en-NZ" dirty="0" smtClean="0">
+                <a:latin typeface="Segoe UI Light" panose="020B0502040204020203" pitchFamily="34" charset="0"/>
+                <a:cs typeface="Segoe UI Light" panose="020B0502040204020203" pitchFamily="34" charset="0"/>
+              </a:rPr>
+              <a:t>Personalised experience</a:t>
+            </a:r>
+          </a:p>
+          <a:p>
+            <a:pPr lvl="1"/>
+            <a:r>
+              <a:rPr lang="en-NZ" dirty="0" smtClean="0"/>
+              <a:t>Setting default original currency</a:t>
+            </a:r>
+          </a:p>
+          <a:p>
+            <a:r>
+              <a:rPr lang="en-NZ" dirty="0" smtClean="0"/>
+              <a:t>Published to a social media connection</a:t>
+            </a:r>
+            <a:endParaRPr lang="en-NZ" dirty="0"/>
+          </a:p>
+          <a:p>
+            <a:pPr lvl="1"/>
+            <a:r>
+              <a:rPr lang="en-NZ" dirty="0" smtClean="0"/>
+              <a:t>Accessibility</a:t>
+            </a:r>
+          </a:p>
+          <a:p>
+            <a:pPr lvl="1"/>
+            <a:r>
+              <a:rPr lang="en-NZ" dirty="0" smtClean="0"/>
+              <a:t>Ease of use</a:t>
+            </a:r>
+          </a:p>
+          <a:p>
+            <a:pPr lvl="1"/>
+            <a:r>
+              <a:rPr lang="en-NZ" dirty="0" smtClean="0"/>
+              <a:t>Efficiency</a:t>
+            </a:r>
+            <a:endParaRPr lang="en-US" dirty="0" smtClean="0">
+              <a:latin typeface="Segoe UI Light" panose="020B0502040204020203" pitchFamily="34" charset="0"/>
+              <a:cs typeface="Segoe UI Light" panose="020B0502040204020203" pitchFamily="34" charset="0"/>
+            </a:endParaRPr>
+          </a:p>
+          <a:p>
+            <a:r>
+              <a:rPr lang="en-NZ" dirty="0" smtClean="0"/>
+              <a:t>Case in-sensitive</a:t>
+            </a:r>
+          </a:p>
+          <a:p>
+            <a:pPr lvl="1"/>
+            <a:r>
+              <a:rPr lang="en-NZ" dirty="0" smtClean="0"/>
+              <a:t>User-friendly</a:t>
+            </a:r>
+            <a:endParaRPr lang="en-NZ" dirty="0"/>
+          </a:p>
           <a:p>
             <a:pPr marL="0" indent="0">
               <a:buNone/>
             </a:pPr>
-            <a:r>
-              <a:rPr lang="en-US" dirty="0">
-                <a:latin typeface="Segoe UI Light" panose="020B0502040204020203" pitchFamily="34" charset="0"/>
-                <a:cs typeface="Segoe UI Light" panose="020B0502040204020203" pitchFamily="34" charset="0"/>
-              </a:rPr>
-              <a:t>- Your Schema, </a:t>
-            </a:r>
-            <a:r>
-              <a:rPr lang="en-US" dirty="0" err="1">
-                <a:latin typeface="Segoe UI Light" panose="020B0502040204020203" pitchFamily="34" charset="0"/>
-                <a:cs typeface="Segoe UI Light" panose="020B0502040204020203" pitchFamily="34" charset="0"/>
-              </a:rPr>
-              <a:t>EasyTables</a:t>
-            </a:r>
-            <a:r>
-              <a:rPr lang="en-US" dirty="0">
-                <a:latin typeface="Segoe UI Light" panose="020B0502040204020203" pitchFamily="34" charset="0"/>
-                <a:cs typeface="Segoe UI Light" panose="020B0502040204020203" pitchFamily="34" charset="0"/>
-              </a:rPr>
-              <a:t>, </a:t>
-            </a:r>
-            <a:r>
-              <a:rPr lang="en-US" dirty="0" err="1">
-                <a:latin typeface="Segoe UI Light" panose="020B0502040204020203" pitchFamily="34" charset="0"/>
-                <a:cs typeface="Segoe UI Light" panose="020B0502040204020203" pitchFamily="34" charset="0"/>
-              </a:rPr>
-              <a:t>etc</a:t>
-            </a:r>
             <a:endParaRPr lang="en-US" dirty="0">
               <a:latin typeface="Segoe UI Light" panose="020B0502040204020203" pitchFamily="34" charset="0"/>
               <a:cs typeface="Segoe UI Light" panose="020B0502040204020203" pitchFamily="34" charset="0"/>
@@ -3870,10 +4110,34 @@
           </a:p>
         </p:txBody>
       </p:sp>
+      <p:pic>
+        <p:nvPicPr>
+          <p:cNvPr id="4" name="Picture 3"/>
+          <p:cNvPicPr>
+            <a:picLocks noChangeAspect="1"/>
+          </p:cNvPicPr>
+          <p:nvPr/>
+        </p:nvPicPr>
+        <p:blipFill>
+          <a:blip r:embed="rId3"/>
+          <a:stretch>
+            <a:fillRect/>
+          </a:stretch>
+        </p:blipFill>
+        <p:spPr>
+          <a:xfrm>
+            <a:off x="7108461" y="1624868"/>
+            <a:ext cx="4417868" cy="4109645"/>
+          </a:xfrm>
+          <a:prstGeom prst="rect">
+            <a:avLst/>
+          </a:prstGeom>
+        </p:spPr>
+      </p:pic>
     </p:spTree>
     <p:extLst>
       <p:ext uri="{BB962C8B-B14F-4D97-AF65-F5344CB8AC3E}">
-        <p14:creationId xmlns:p14="http://schemas.microsoft.com/office/powerpoint/2010/main" val="2098138885"/>
+        <p14:creationId xmlns:p14="http://schemas.microsoft.com/office/powerpoint/2010/main" val="3784702973"/>
       </p:ext>
     </p:extLst>
   </p:cSld>
@@ -3917,7 +4181,7 @@
           <a:p>
             <a:r>
               <a:rPr lang="en-US" dirty="0"/>
-              <a:t>API</a:t>
+              <a:t>Databases</a:t>
             </a:r>
             <a:endParaRPr lang="en-US" dirty="0">
               <a:latin typeface="Segoe UI Light" panose="020B0502040204020203" pitchFamily="34" charset="0"/>
@@ -3936,28 +4200,159 @@
             <p:ph idx="1"/>
           </p:nvPr>
         </p:nvSpPr>
-        <p:spPr/>
-        <p:txBody>
-          <a:bodyPr/>
-          <a:lstStyle/>
-          <a:p>
-            <a:pPr marL="0" indent="0">
-              <a:buNone/>
-            </a:pPr>
-            <a:r>
-              <a:rPr lang="en-US" dirty="0">
+        <p:spPr>
+          <a:xfrm>
+            <a:off x="838200" y="1483743"/>
+            <a:ext cx="10515600" cy="2173857"/>
+          </a:xfrm>
+        </p:spPr>
+        <p:txBody>
+          <a:bodyPr>
+            <a:normAutofit fontScale="92500" lnSpcReduction="20000"/>
+          </a:bodyPr>
+          <a:lstStyle/>
+          <a:p>
+            <a:r>
+              <a:rPr lang="en-US" dirty="0" smtClean="0"/>
+              <a:t>Table Name: </a:t>
+            </a:r>
+            <a:r>
+              <a:rPr lang="en-US" dirty="0" err="1" smtClean="0"/>
+              <a:t>BankAccount</a:t>
+            </a:r>
+            <a:endParaRPr lang="en-US" dirty="0" smtClean="0">
+              <a:latin typeface="Segoe UI Light" panose="020B0502040204020203" pitchFamily="34" charset="0"/>
+              <a:cs typeface="Segoe UI Light" panose="020B0502040204020203" pitchFamily="34" charset="0"/>
+            </a:endParaRPr>
+          </a:p>
+          <a:p>
+            <a:r>
+              <a:rPr lang="en-US" dirty="0" smtClean="0">
                 <a:latin typeface="Segoe UI Light" panose="020B0502040204020203" pitchFamily="34" charset="0"/>
                 <a:cs typeface="Segoe UI Light" panose="020B0502040204020203" pitchFamily="34" charset="0"/>
               </a:rPr>
-              <a:t>What API you used and why. How it integrates with your app</a:t>
-            </a:r>
-          </a:p>
-        </p:txBody>
-      </p:sp>
+              <a:t>Primary Key: ID (Unique)</a:t>
+            </a:r>
+          </a:p>
+          <a:p>
+            <a:pPr lvl="1"/>
+            <a:r>
+              <a:rPr lang="en-US" dirty="0" smtClean="0"/>
+              <a:t>Assuming that once an account has been deleted, the same </a:t>
+            </a:r>
+            <a:r>
+              <a:rPr lang="en-US" dirty="0" err="1" smtClean="0"/>
+              <a:t>AcctNo</a:t>
+            </a:r>
+            <a:r>
+              <a:rPr lang="en-US" dirty="0" smtClean="0"/>
+              <a:t> could be assigned to another person.</a:t>
+            </a:r>
+            <a:endParaRPr lang="en-US" dirty="0" smtClean="0">
+              <a:latin typeface="Segoe UI Light" panose="020B0502040204020203" pitchFamily="34" charset="0"/>
+              <a:cs typeface="Segoe UI Light" panose="020B0502040204020203" pitchFamily="34" charset="0"/>
+            </a:endParaRPr>
+          </a:p>
+          <a:p>
+            <a:r>
+              <a:rPr lang="en-US" dirty="0" smtClean="0">
+                <a:latin typeface="Segoe UI Light" panose="020B0502040204020203" pitchFamily="34" charset="0"/>
+                <a:cs typeface="Segoe UI Light" panose="020B0502040204020203" pitchFamily="34" charset="0"/>
+              </a:rPr>
+              <a:t>Fields: ID, </a:t>
+            </a:r>
+            <a:r>
+              <a:rPr lang="en-US" dirty="0" err="1" smtClean="0">
+                <a:latin typeface="Segoe UI Light" panose="020B0502040204020203" pitchFamily="34" charset="0"/>
+                <a:cs typeface="Segoe UI Light" panose="020B0502040204020203" pitchFamily="34" charset="0"/>
+              </a:rPr>
+              <a:t>FirstName</a:t>
+            </a:r>
+            <a:r>
+              <a:rPr lang="en-US" dirty="0" smtClean="0">
+                <a:latin typeface="Segoe UI Light" panose="020B0502040204020203" pitchFamily="34" charset="0"/>
+                <a:cs typeface="Segoe UI Light" panose="020B0502040204020203" pitchFamily="34" charset="0"/>
+              </a:rPr>
+              <a:t>, </a:t>
+            </a:r>
+            <a:r>
+              <a:rPr lang="en-US" dirty="0" err="1" smtClean="0">
+                <a:latin typeface="Segoe UI Light" panose="020B0502040204020203" pitchFamily="34" charset="0"/>
+                <a:cs typeface="Segoe UI Light" panose="020B0502040204020203" pitchFamily="34" charset="0"/>
+              </a:rPr>
+              <a:t>LastName</a:t>
+            </a:r>
+            <a:r>
+              <a:rPr lang="en-US" dirty="0" smtClean="0">
+                <a:latin typeface="Segoe UI Light" panose="020B0502040204020203" pitchFamily="34" charset="0"/>
+                <a:cs typeface="Segoe UI Light" panose="020B0502040204020203" pitchFamily="34" charset="0"/>
+              </a:rPr>
+              <a:t>, </a:t>
+            </a:r>
+            <a:r>
+              <a:rPr lang="en-US" dirty="0" err="1" smtClean="0">
+                <a:latin typeface="Segoe UI Light" panose="020B0502040204020203" pitchFamily="34" charset="0"/>
+                <a:cs typeface="Segoe UI Light" panose="020B0502040204020203" pitchFamily="34" charset="0"/>
+              </a:rPr>
+              <a:t>AcctNo</a:t>
+            </a:r>
+            <a:r>
+              <a:rPr lang="en-US" dirty="0" smtClean="0">
+                <a:latin typeface="Segoe UI Light" panose="020B0502040204020203" pitchFamily="34" charset="0"/>
+                <a:cs typeface="Segoe UI Light" panose="020B0502040204020203" pitchFamily="34" charset="0"/>
+              </a:rPr>
+              <a:t>, Balance </a:t>
+            </a:r>
+          </a:p>
+          <a:p>
+            <a:pPr lvl="1"/>
+            <a:r>
+              <a:rPr lang="en-US" dirty="0" smtClean="0"/>
+              <a:t>Contoso </a:t>
+            </a:r>
+            <a:r>
+              <a:rPr lang="en-US" b="1" dirty="0" smtClean="0"/>
+              <a:t>Bank</a:t>
+            </a:r>
+            <a:r>
+              <a:rPr lang="en-US" dirty="0" smtClean="0"/>
+              <a:t> – bank accounts, deposits, withdrawals</a:t>
+            </a:r>
+            <a:endParaRPr lang="en-US" dirty="0">
+              <a:latin typeface="Segoe UI Light" panose="020B0502040204020203" pitchFamily="34" charset="0"/>
+              <a:cs typeface="Segoe UI Light" panose="020B0502040204020203" pitchFamily="34" charset="0"/>
+            </a:endParaRPr>
+          </a:p>
+        </p:txBody>
+      </p:sp>
+      <p:pic>
+        <p:nvPicPr>
+          <p:cNvPr id="5" name="Picture 4"/>
+          <p:cNvPicPr>
+            <a:picLocks noChangeAspect="1"/>
+          </p:cNvPicPr>
+          <p:nvPr/>
+        </p:nvPicPr>
+        <p:blipFill>
+          <a:blip r:embed="rId3"/>
+          <a:stretch>
+            <a:fillRect/>
+          </a:stretch>
+        </p:blipFill>
+        <p:spPr>
+          <a:xfrm>
+            <a:off x="1301681" y="3778339"/>
+            <a:ext cx="9588637" cy="1995757"/>
+          </a:xfrm>
+          <a:prstGeom prst="rect">
+            <a:avLst/>
+          </a:prstGeom>
+        </p:spPr>
+      </p:pic>
     </p:spTree>
     <p:extLst>
       <p:ext uri="{BB962C8B-B14F-4D97-AF65-F5344CB8AC3E}">
-        <p14:creationId xmlns:p14="http://schemas.microsoft.com/office/powerpoint/2010/main" val="276898515"/>
+        <p14:creationId xmlns:p14="http://schemas.microsoft.com/office/powerpoint/2010/main" val="2098138885"/>
       </p:ext>
     </p:extLst>
   </p:cSld>
@@ -4000,33 +4395,9 @@
           <a:lstStyle/>
           <a:p>
             <a:r>
-              <a:rPr lang="en-US" dirty="0">
-                <a:latin typeface="Segoe UI Light" panose="020B0502040204020203" pitchFamily="34" charset="0"/>
-                <a:cs typeface="Segoe UI Light" panose="020B0502040204020203" pitchFamily="34" charset="0"/>
-              </a:rPr>
-              <a:t>Azure Setup</a:t>
-            </a:r>
-          </a:p>
-        </p:txBody>
-      </p:sp>
-      <p:sp>
-        <p:nvSpPr>
-          <p:cNvPr id="3" name="Subtitle 2"/>
-          <p:cNvSpPr>
-            <a:spLocks noGrp="1"/>
-          </p:cNvSpPr>
-          <p:nvPr>
-            <p:ph idx="1"/>
-          </p:nvPr>
-        </p:nvSpPr>
-        <p:spPr/>
-        <p:txBody>
-          <a:bodyPr/>
-          <a:lstStyle/>
-          <a:p>
-            <a:pPr marL="0" indent="0">
-              <a:buNone/>
-            </a:pPr>
+              <a:rPr lang="en-US" dirty="0" smtClean="0"/>
+              <a:t>Databases - CRUD</a:t>
+            </a:r>
             <a:endParaRPr lang="en-US" dirty="0">
               <a:latin typeface="Segoe UI Light" panose="020B0502040204020203" pitchFamily="34" charset="0"/>
               <a:cs typeface="Segoe UI Light" panose="020B0502040204020203" pitchFamily="34" charset="0"/>
@@ -4034,10 +4405,162 @@
           </a:p>
         </p:txBody>
       </p:sp>
+      <p:sp>
+        <p:nvSpPr>
+          <p:cNvPr id="3" name="Subtitle 2"/>
+          <p:cNvSpPr>
+            <a:spLocks noGrp="1"/>
+          </p:cNvSpPr>
+          <p:nvPr>
+            <p:ph idx="1"/>
+          </p:nvPr>
+        </p:nvSpPr>
+        <p:spPr>
+          <a:xfrm>
+            <a:off x="838200" y="1483743"/>
+            <a:ext cx="10515600" cy="2173857"/>
+          </a:xfrm>
+        </p:spPr>
+        <p:txBody>
+          <a:bodyPr>
+            <a:normAutofit/>
+          </a:bodyPr>
+          <a:lstStyle/>
+          <a:p>
+            <a:r>
+              <a:rPr lang="en-US" dirty="0" smtClean="0"/>
+              <a:t>Create – “Create Account”</a:t>
+            </a:r>
+          </a:p>
+          <a:p>
+            <a:r>
+              <a:rPr lang="en-US" dirty="0" smtClean="0">
+                <a:latin typeface="Segoe UI Light" panose="020B0502040204020203" pitchFamily="34" charset="0"/>
+                <a:cs typeface="Segoe UI Light" panose="020B0502040204020203" pitchFamily="34" charset="0"/>
+              </a:rPr>
+              <a:t>Read – “View Account”</a:t>
+            </a:r>
+          </a:p>
+          <a:p>
+            <a:r>
+              <a:rPr lang="en-US" dirty="0" smtClean="0"/>
+              <a:t>Update – “Deposit” / “Withdraw”</a:t>
+            </a:r>
+          </a:p>
+          <a:p>
+            <a:r>
+              <a:rPr lang="en-US" dirty="0" smtClean="0">
+                <a:latin typeface="Segoe UI Light" panose="020B0502040204020203" pitchFamily="34" charset="0"/>
+                <a:cs typeface="Segoe UI Light" panose="020B0502040204020203" pitchFamily="34" charset="0"/>
+              </a:rPr>
+              <a:t>Delete – “Delete Account”</a:t>
+            </a:r>
+            <a:endParaRPr lang="en-US" dirty="0">
+              <a:latin typeface="Segoe UI Light" panose="020B0502040204020203" pitchFamily="34" charset="0"/>
+              <a:cs typeface="Segoe UI Light" panose="020B0502040204020203" pitchFamily="34" charset="0"/>
+            </a:endParaRPr>
+          </a:p>
+        </p:txBody>
+      </p:sp>
+      <p:pic>
+        <p:nvPicPr>
+          <p:cNvPr id="7" name="Picture 6"/>
+          <p:cNvPicPr>
+            <a:picLocks noChangeAspect="1"/>
+          </p:cNvPicPr>
+          <p:nvPr/>
+        </p:nvPicPr>
+        <p:blipFill>
+          <a:blip r:embed="rId3"/>
+          <a:stretch>
+            <a:fillRect/>
+          </a:stretch>
+        </p:blipFill>
+        <p:spPr>
+          <a:xfrm>
+            <a:off x="8012794" y="766761"/>
+            <a:ext cx="3162300" cy="1057275"/>
+          </a:xfrm>
+          <a:prstGeom prst="rect">
+            <a:avLst/>
+          </a:prstGeom>
+        </p:spPr>
+      </p:pic>
+      <p:pic>
+        <p:nvPicPr>
+          <p:cNvPr id="8" name="Picture 7"/>
+          <p:cNvPicPr>
+            <a:picLocks noChangeAspect="1"/>
+          </p:cNvPicPr>
+          <p:nvPr/>
+        </p:nvPicPr>
+        <p:blipFill>
+          <a:blip r:embed="rId4"/>
+          <a:stretch>
+            <a:fillRect/>
+          </a:stretch>
+        </p:blipFill>
+        <p:spPr>
+          <a:xfrm>
+            <a:off x="8012794" y="2078151"/>
+            <a:ext cx="3152775" cy="971550"/>
+          </a:xfrm>
+          <a:prstGeom prst="rect">
+            <a:avLst/>
+          </a:prstGeom>
+        </p:spPr>
+      </p:pic>
+      <p:pic>
+        <p:nvPicPr>
+          <p:cNvPr id="9" name="Picture 8"/>
+          <p:cNvPicPr>
+            <a:picLocks noChangeAspect="1"/>
+          </p:cNvPicPr>
+          <p:nvPr/>
+        </p:nvPicPr>
+        <p:blipFill rotWithShape="1">
+          <a:blip r:embed="rId5"/>
+          <a:srcRect b="2458"/>
+          <a:stretch/>
+        </p:blipFill>
+        <p:spPr>
+          <a:xfrm>
+            <a:off x="8041369" y="3241107"/>
+            <a:ext cx="3133725" cy="2285546"/>
+          </a:xfrm>
+          <a:prstGeom prst="rect">
+            <a:avLst/>
+          </a:prstGeom>
+        </p:spPr>
+      </p:pic>
+      <p:pic>
+        <p:nvPicPr>
+          <p:cNvPr id="10" name="Picture 9"/>
+          <p:cNvPicPr>
+            <a:picLocks noChangeAspect="1"/>
+          </p:cNvPicPr>
+          <p:nvPr/>
+        </p:nvPicPr>
+        <p:blipFill>
+          <a:blip r:embed="rId6"/>
+          <a:stretch>
+            <a:fillRect/>
+          </a:stretch>
+        </p:blipFill>
+        <p:spPr>
+          <a:xfrm>
+            <a:off x="4016375" y="4107428"/>
+            <a:ext cx="3143250" cy="1419225"/>
+          </a:xfrm>
+          <a:prstGeom prst="rect">
+            <a:avLst/>
+          </a:prstGeom>
+        </p:spPr>
+      </p:pic>
     </p:spTree>
     <p:extLst>
       <p:ext uri="{BB962C8B-B14F-4D97-AF65-F5344CB8AC3E}">
-        <p14:creationId xmlns:p14="http://schemas.microsoft.com/office/powerpoint/2010/main" val="735530574"/>
+        <p14:creationId xmlns:p14="http://schemas.microsoft.com/office/powerpoint/2010/main" val="1970230898"/>
       </p:ext>
     </p:extLst>
   </p:cSld>
@@ -4080,18 +4603,23 @@
           <a:lstStyle/>
           <a:p>
             <a:r>
-              <a:rPr lang="en-US" dirty="0">
-                <a:latin typeface="Segoe UI Light" panose="020B0502040204020203" pitchFamily="34" charset="0"/>
-                <a:cs typeface="Segoe UI Light" panose="020B0502040204020203" pitchFamily="34" charset="0"/>
-              </a:rPr>
-              <a:t>Advanced Features</a:t>
-            </a:r>
-          </a:p>
-        </p:txBody>
-      </p:sp>
-      <p:sp>
-        <p:nvSpPr>
-          <p:cNvPr id="3" name="Subtitle 2"/>
+              <a:rPr lang="en-US" dirty="0" smtClean="0"/>
+              <a:t>Final Comments</a:t>
+            </a:r>
+            <a:br>
+              <a:rPr lang="en-US" dirty="0" smtClean="0"/>
+            </a:br>
+            <a:r>
+              <a:rPr lang="en-US" dirty="0" smtClean="0"/>
+              <a:t>Improvements to Consider</a:t>
+            </a:r>
+            <a:endParaRPr lang="en-NZ" dirty="0"/>
+          </a:p>
+        </p:txBody>
+      </p:sp>
+      <p:sp>
+        <p:nvSpPr>
+          <p:cNvPr id="3" name="Content Placeholder 2"/>
           <p:cNvSpPr>
             <a:spLocks noGrp="1"/>
           </p:cNvSpPr>
@@ -4099,105 +4627,149 @@
             <p:ph idx="1"/>
           </p:nvPr>
         </p:nvSpPr>
-        <p:spPr/>
-        <p:txBody>
-          <a:bodyPr/>
-          <a:lstStyle/>
-          <a:p>
-            <a:pPr marL="0" indent="0">
-              <a:buNone/>
-            </a:pPr>
-            <a:endParaRPr lang="en-US" dirty="0">
-              <a:latin typeface="Segoe UI Light" panose="020B0502040204020203" pitchFamily="34" charset="0"/>
-              <a:cs typeface="Segoe UI Light" panose="020B0502040204020203" pitchFamily="34" charset="0"/>
-            </a:endParaRPr>
-          </a:p>
-        </p:txBody>
-      </p:sp>
+        <p:spPr>
+          <a:xfrm>
+            <a:off x="838200" y="2031999"/>
+            <a:ext cx="10515600" cy="4144963"/>
+          </a:xfrm>
+        </p:spPr>
+        <p:txBody>
+          <a:bodyPr/>
+          <a:lstStyle/>
+          <a:p>
+            <a:r>
+              <a:rPr lang="en-NZ" dirty="0" smtClean="0"/>
+              <a:t>Databases</a:t>
+            </a:r>
+          </a:p>
+          <a:p>
+            <a:pPr lvl="1"/>
+            <a:r>
+              <a:rPr lang="en-NZ" dirty="0" smtClean="0"/>
+              <a:t>Store hashes instead of passwords for authentication</a:t>
+            </a:r>
+          </a:p>
+          <a:p>
+            <a:pPr lvl="1"/>
+            <a:r>
+              <a:rPr lang="en-NZ" dirty="0" smtClean="0"/>
+              <a:t>More user information</a:t>
+            </a:r>
+          </a:p>
+          <a:p>
+            <a:r>
+              <a:rPr lang="en-NZ" dirty="0" smtClean="0"/>
+              <a:t>Additional APIs and Presentation</a:t>
+            </a:r>
+          </a:p>
+          <a:p>
+            <a:pPr lvl="1"/>
+            <a:r>
+              <a:rPr lang="en-NZ" dirty="0" smtClean="0"/>
+              <a:t>Stocks – carousel</a:t>
+            </a:r>
+          </a:p>
+          <a:p>
+            <a:r>
+              <a:rPr lang="en-NZ" dirty="0" smtClean="0"/>
+              <a:t>LUIS natural language integration</a:t>
+            </a:r>
+          </a:p>
+          <a:p>
+            <a:endParaRPr lang="en-NZ" dirty="0"/>
+          </a:p>
+          <a:p>
+            <a:pPr lvl="1"/>
+            <a:endParaRPr lang="en-NZ" dirty="0"/>
+          </a:p>
+        </p:txBody>
+      </p:sp>
+      <p:pic>
+        <p:nvPicPr>
+          <p:cNvPr id="2050" name="Picture 2" descr="https://www.casino.org/blog/wp-content/uploads/stock_exchange.jpg"/>
+          <p:cNvPicPr>
+            <a:picLocks noChangeAspect="1" noChangeArrowheads="1"/>
+          </p:cNvPicPr>
+          <p:nvPr/>
+        </p:nvPicPr>
+        <p:blipFill>
+          <a:blip r:embed="rId2">
+            <a:extLst>
+              <a:ext uri="{28A0092B-C50C-407E-A947-70E740481C1C}">
+                <a14:useLocalDpi xmlns:a14="http://schemas.microsoft.com/office/drawing/2010/main" val="0"/>
+              </a:ext>
+            </a:extLst>
+          </a:blip>
+          <a:srcRect/>
+          <a:stretch>
+            <a:fillRect/>
+          </a:stretch>
+        </p:blipFill>
+        <p:spPr bwMode="auto">
+          <a:xfrm>
+            <a:off x="7489372" y="2992159"/>
+            <a:ext cx="4137931" cy="2719212"/>
+          </a:xfrm>
+          <a:prstGeom prst="rect">
+            <a:avLst/>
+          </a:prstGeom>
+          <a:noFill/>
+          <a:extLst>
+            <a:ext uri="{909E8E84-426E-40DD-AFC4-6F175D3DCCD1}">
+              <a14:hiddenFill xmlns:a14="http://schemas.microsoft.com/office/drawing/2010/main">
+                <a:solidFill>
+                  <a:srgbClr val="FFFFFF"/>
+                </a:solidFill>
+              </a14:hiddenFill>
+            </a:ext>
+          </a:extLst>
+        </p:spPr>
+      </p:pic>
+      <p:pic>
+        <p:nvPicPr>
+          <p:cNvPr id="2052" name="Picture 4" descr="https://comms.anz.co.nz/objects/article/58/69/01/16958/images/Send-Money-Overseas-account-debited.png"/>
+          <p:cNvPicPr>
+            <a:picLocks noChangeAspect="1" noChangeArrowheads="1"/>
+          </p:cNvPicPr>
+          <p:nvPr/>
+        </p:nvPicPr>
+        <p:blipFill>
+          <a:blip r:embed="rId3">
+            <a:extLst>
+              <a:ext uri="{28A0092B-C50C-407E-A947-70E740481C1C}">
+                <a14:useLocalDpi xmlns:a14="http://schemas.microsoft.com/office/drawing/2010/main" val="0"/>
+              </a:ext>
+            </a:extLst>
+          </a:blip>
+          <a:srcRect/>
+          <a:stretch>
+            <a:fillRect/>
+          </a:stretch>
+        </p:blipFill>
+        <p:spPr bwMode="auto">
+          <a:xfrm>
+            <a:off x="8098971" y="494776"/>
+            <a:ext cx="3528332" cy="1780877"/>
+          </a:xfrm>
+          <a:prstGeom prst="rect">
+            <a:avLst/>
+          </a:prstGeom>
+          <a:noFill/>
+          <a:extLst>
+            <a:ext uri="{909E8E84-426E-40DD-AFC4-6F175D3DCCD1}">
+              <a14:hiddenFill xmlns:a14="http://schemas.microsoft.com/office/drawing/2010/main">
+                <a:solidFill>
+                  <a:srgbClr val="FFFFFF"/>
+                </a:solidFill>
+              </a14:hiddenFill>
+            </a:ext>
+          </a:extLst>
+        </p:spPr>
+      </p:pic>
     </p:spTree>
     <p:extLst>
       <p:ext uri="{BB962C8B-B14F-4D97-AF65-F5344CB8AC3E}">
-        <p14:creationId xmlns:p14="http://schemas.microsoft.com/office/powerpoint/2010/main" val="572045017"/>
-      </p:ext>
-    </p:extLst>
-  </p:cSld>
-  <p:clrMapOvr>
-    <a:masterClrMapping/>
-  </p:clrMapOvr>
-</p:sld>
-</file>
-
-<file path=ppt/slides/slide9.xml><?xml version="1.0" encoding="utf-8"?>
-<p:sld xmlns:a="http://schemas.openxmlformats.org/drawingml/2006/main" xmlns:r="http://schemas.openxmlformats.org/officeDocument/2006/relationships" xmlns:p="http://schemas.openxmlformats.org/presentationml/2006/main">
-  <p:cSld>
-    <p:spTree>
-      <p:nvGrpSpPr>
-        <p:cNvPr id="1" name=""/>
-        <p:cNvGrpSpPr/>
-        <p:nvPr/>
-      </p:nvGrpSpPr>
-      <p:grpSpPr>
-        <a:xfrm>
-          <a:off x="0" y="0"/>
-          <a:ext cx="0" cy="0"/>
-          <a:chOff x="0" y="0"/>
-          <a:chExt cx="0" cy="0"/>
-        </a:xfrm>
-      </p:grpSpPr>
-      <p:sp>
-        <p:nvSpPr>
-          <p:cNvPr id="2" name="Title 1"/>
-          <p:cNvSpPr>
-            <a:spLocks noGrp="1"/>
-          </p:cNvSpPr>
-          <p:nvPr>
-            <p:ph type="title"/>
-          </p:nvPr>
-        </p:nvSpPr>
-        <p:spPr/>
-        <p:txBody>
-          <a:bodyPr/>
-          <a:lstStyle/>
-          <a:p>
-            <a:r>
-              <a:rPr lang="en-US" dirty="0">
-                <a:latin typeface="Segoe UI Light" panose="020B0502040204020203" pitchFamily="34" charset="0"/>
-                <a:cs typeface="Segoe UI Light" panose="020B0502040204020203" pitchFamily="34" charset="0"/>
-              </a:rPr>
-              <a:t>Advanced Considerations</a:t>
-            </a:r>
-          </a:p>
-        </p:txBody>
-      </p:sp>
-      <p:sp>
-        <p:nvSpPr>
-          <p:cNvPr id="3" name="Subtitle 2"/>
-          <p:cNvSpPr>
-            <a:spLocks noGrp="1"/>
-          </p:cNvSpPr>
-          <p:nvPr>
-            <p:ph idx="1"/>
-          </p:nvPr>
-        </p:nvSpPr>
-        <p:spPr/>
-        <p:txBody>
-          <a:bodyPr/>
-          <a:lstStyle/>
-          <a:p>
-            <a:pPr marL="0" indent="0">
-              <a:buNone/>
-            </a:pPr>
-            <a:endParaRPr lang="en-US" dirty="0">
-              <a:latin typeface="Segoe UI Light" panose="020B0502040204020203" pitchFamily="34" charset="0"/>
-              <a:cs typeface="Segoe UI Light" panose="020B0502040204020203" pitchFamily="34" charset="0"/>
-            </a:endParaRPr>
-          </a:p>
-        </p:txBody>
-      </p:sp>
-    </p:spTree>
-    <p:extLst>
-      <p:ext uri="{BB962C8B-B14F-4D97-AF65-F5344CB8AC3E}">
-        <p14:creationId xmlns:p14="http://schemas.microsoft.com/office/powerpoint/2010/main" val="2870665585"/>
+        <p14:creationId xmlns:p14="http://schemas.microsoft.com/office/powerpoint/2010/main" val="1151439731"/>
       </p:ext>
     </p:extLst>
   </p:cSld>

</xml_diff>